<commit_message>
update rational exponents, add limits notes
</commit_message>
<xml_diff>
--- a/_PowerPoints/2nd Semester/Unit 10 Rational Exponents (from Algebra 4)/PreCalc_Day_069 Quiz and Review.pptx
+++ b/_PowerPoints/2nd Semester/Unit 10 Rational Exponents (from Algebra 4)/PreCalc_Day_069 Quiz and Review.pptx
@@ -5,13 +5,14 @@
     <p:sldMasterId id="2147483648" r:id="rId1"/>
   </p:sldMasterIdLst>
   <p:handoutMasterIdLst>
-    <p:handoutMasterId r:id="rId6"/>
+    <p:handoutMasterId r:id="rId7"/>
   </p:handoutMasterIdLst>
   <p:sldIdLst>
     <p:sldId id="263" r:id="rId2"/>
-    <p:sldId id="286" r:id="rId3"/>
-    <p:sldId id="285" r:id="rId4"/>
-    <p:sldId id="284" r:id="rId5"/>
+    <p:sldId id="288" r:id="rId3"/>
+    <p:sldId id="286" r:id="rId4"/>
+    <p:sldId id="285" r:id="rId5"/>
+    <p:sldId id="284" r:id="rId6"/>
   </p:sldIdLst>
   <p:sldSz cx="12192000" cy="6858000"/>
   <p:notesSz cx="7010400" cy="9296400"/>
@@ -200,7 +201,7 @@
           <a:p>
             <a:fld id="{FAC4242D-6570-4D26-878C-5DE8AD62D39F}" type="datetimeFigureOut">
               <a:rPr lang="en-US" smtClean="0"/>
-              <a:t>4/10/2018</a:t>
+              <a:t>4/11/2018</a:t>
             </a:fld>
             <a:endParaRPr lang="en-US"/>
           </a:p>
@@ -453,7 +454,7 @@
             <a:fld id="{87DE6118-2437-4B30-8E3C-4D2BE6020583}" type="datetimeFigureOut">
               <a:rPr lang="en-US" dirty="0"/>
               <a:pPr/>
-              <a:t>4/10/2018</a:t>
+              <a:t>4/11/2018</a:t>
             </a:fld>
             <a:endParaRPr lang="en-US" dirty="0"/>
           </a:p>
@@ -779,7 +780,7 @@
           <a:p>
             <a:fld id="{87DE6118-2437-4B30-8E3C-4D2BE6020583}" type="datetimeFigureOut">
               <a:rPr lang="en-US" dirty="0"/>
-              <a:t>4/10/2018</a:t>
+              <a:t>4/11/2018</a:t>
             </a:fld>
             <a:endParaRPr lang="en-US" dirty="0"/>
           </a:p>
@@ -954,7 +955,7 @@
           <a:p>
             <a:fld id="{87DE6118-2437-4B30-8E3C-4D2BE6020583}" type="datetimeFigureOut">
               <a:rPr lang="en-US" dirty="0"/>
-              <a:t>4/10/2018</a:t>
+              <a:t>4/11/2018</a:t>
             </a:fld>
             <a:endParaRPr lang="en-US" dirty="0"/>
           </a:p>
@@ -1119,7 +1120,7 @@
           <a:p>
             <a:fld id="{87DE6118-2437-4B30-8E3C-4D2BE6020583}" type="datetimeFigureOut">
               <a:rPr lang="en-US" dirty="0"/>
-              <a:t>4/10/2018</a:t>
+              <a:t>4/11/2018</a:t>
             </a:fld>
             <a:endParaRPr lang="en-US" dirty="0"/>
           </a:p>
@@ -1392,7 +1393,7 @@
             <a:fld id="{87DE6118-2437-4B30-8E3C-4D2BE6020583}" type="datetimeFigureOut">
               <a:rPr lang="en-US" dirty="0"/>
               <a:pPr/>
-              <a:t>4/10/2018</a:t>
+              <a:t>4/11/2018</a:t>
             </a:fld>
             <a:endParaRPr lang="en-US" dirty="0"/>
           </a:p>
@@ -1782,7 +1783,7 @@
           <a:p>
             <a:fld id="{87DE6118-2437-4B30-8E3C-4D2BE6020583}" type="datetimeFigureOut">
               <a:rPr lang="en-US" dirty="0"/>
-              <a:t>4/10/2018</a:t>
+              <a:t>4/11/2018</a:t>
             </a:fld>
             <a:endParaRPr lang="en-US" dirty="0"/>
           </a:p>
@@ -2254,7 +2255,7 @@
           <a:p>
             <a:fld id="{87DE6118-2437-4B30-8E3C-4D2BE6020583}" type="datetimeFigureOut">
               <a:rPr lang="en-US" dirty="0"/>
-              <a:t>4/10/2018</a:t>
+              <a:t>4/11/2018</a:t>
             </a:fld>
             <a:endParaRPr lang="en-US" dirty="0"/>
           </a:p>
@@ -2367,7 +2368,7 @@
           <a:p>
             <a:fld id="{87DE6118-2437-4B30-8E3C-4D2BE6020583}" type="datetimeFigureOut">
               <a:rPr lang="en-US" dirty="0"/>
-              <a:t>4/10/2018</a:t>
+              <a:t>4/11/2018</a:t>
             </a:fld>
             <a:endParaRPr lang="en-US" dirty="0"/>
           </a:p>
@@ -2457,7 +2458,7 @@
           <a:p>
             <a:fld id="{87DE6118-2437-4B30-8E3C-4D2BE6020583}" type="datetimeFigureOut">
               <a:rPr lang="en-US" dirty="0"/>
-              <a:t>4/10/2018</a:t>
+              <a:t>4/11/2018</a:t>
             </a:fld>
             <a:endParaRPr lang="en-US" dirty="0"/>
           </a:p>
@@ -2799,7 +2800,7 @@
             <a:fld id="{87DE6118-2437-4B30-8E3C-4D2BE6020583}" type="datetimeFigureOut">
               <a:rPr lang="en-US" dirty="0"/>
               <a:pPr/>
-              <a:t>4/10/2018</a:t>
+              <a:t>4/11/2018</a:t>
             </a:fld>
             <a:endParaRPr lang="en-US" dirty="0"/>
           </a:p>
@@ -3184,7 +3185,7 @@
             <a:fld id="{87DE6118-2437-4B30-8E3C-4D2BE6020583}" type="datetimeFigureOut">
               <a:rPr lang="en-US" dirty="0"/>
               <a:pPr/>
-              <a:t>4/10/2018</a:t>
+              <a:t>4/11/2018</a:t>
             </a:fld>
             <a:endParaRPr lang="en-US" dirty="0"/>
           </a:p>
@@ -3459,7 +3460,7 @@
             <a:fld id="{87DE6118-2437-4B30-8E3C-4D2BE6020583}" type="datetimeFigureOut">
               <a:rPr lang="en-US" dirty="0"/>
               <a:pPr/>
-              <a:t>4/10/2018</a:t>
+              <a:t>4/11/2018</a:t>
             </a:fld>
             <a:endParaRPr lang="en-US" dirty="0"/>
           </a:p>
@@ -4013,12 +4014,12 @@
           <a:lstStyle/>
           <a:p>
             <a:r>
-              <a:rPr lang="en-US" dirty="0"/>
+              <a:rPr lang="en-US"/>
               <a:t>Day </a:t>
             </a:r>
             <a:r>
-              <a:rPr lang="en-US" dirty="0" smtClean="0"/>
-              <a:t>70</a:t>
+              <a:rPr lang="en-US" smtClean="0"/>
+              <a:t>69</a:t>
             </a:r>
             <a:endParaRPr lang="en-US" dirty="0"/>
           </a:p>
@@ -4071,25 +4072,146 @@
             <p:ph type="title"/>
           </p:nvPr>
         </p:nvSpPr>
-        <p:spPr>
-          <a:xfrm>
-            <a:off x="1371600" y="800100"/>
-            <a:ext cx="10820400" cy="1485900"/>
-          </a:xfrm>
-        </p:spPr>
+        <p:spPr/>
+        <p:txBody>
+          <a:bodyPr/>
+          <a:lstStyle/>
+          <a:p>
+            <a:r>
+              <a:rPr lang="en-US" dirty="0" smtClean="0"/>
+              <a:t>From Last Time</a:t>
+            </a:r>
+            <a:endParaRPr lang="en-US" dirty="0"/>
+          </a:p>
+        </p:txBody>
+      </p:sp>
+      <p:sp>
+        <p:nvSpPr>
+          <p:cNvPr id="3" name="Content Placeholder 2"/>
+          <p:cNvSpPr>
+            <a:spLocks noGrp="1"/>
+          </p:cNvSpPr>
+          <p:nvPr>
+            <p:ph idx="1"/>
+          </p:nvPr>
+        </p:nvSpPr>
+        <p:spPr/>
         <p:txBody>
           <a:bodyPr>
             <a:normAutofit/>
           </a:bodyPr>
           <a:lstStyle/>
           <a:p>
+            <a:pPr marL="0" indent="0">
+              <a:buNone/>
+            </a:pPr>
+            <a:r>
+              <a:rPr lang="en-US" sz="4000" b="1" dirty="0" smtClean="0"/>
+              <a:t>6.6   page </a:t>
+            </a:r>
+            <a:r>
+              <a:rPr lang="en-US" sz="4000" b="1" dirty="0"/>
+              <a:t>401 #1-13, 15-35 (odd), </a:t>
+            </a:r>
+            <a:r>
+              <a:rPr lang="en-US" sz="4000" b="1" dirty="0" smtClean="0"/>
+              <a:t>36-38</a:t>
+            </a:r>
+          </a:p>
+          <a:p>
+            <a:pPr marL="0" indent="0">
+              <a:buNone/>
+            </a:pPr>
+            <a:endParaRPr lang="en-US" sz="4000" b="1" dirty="0"/>
+          </a:p>
+          <a:p>
+            <a:pPr marL="0" indent="0">
+              <a:buNone/>
+            </a:pPr>
+            <a:endParaRPr lang="en-US" sz="4000" b="1" dirty="0" smtClean="0"/>
+          </a:p>
+          <a:p>
+            <a:pPr marL="0" indent="0">
+              <a:buNone/>
+            </a:pPr>
+            <a:r>
+              <a:rPr lang="en-US" sz="4000" b="1" dirty="0" smtClean="0"/>
+              <a:t>6.7  </a:t>
+            </a:r>
+            <a:r>
+              <a:rPr lang="en-US" sz="4000" b="1" dirty="0"/>
+              <a:t>page 409 #9-21 (odd), 37</a:t>
+            </a:r>
+            <a:endParaRPr lang="en-US" sz="4000" dirty="0"/>
+          </a:p>
+        </p:txBody>
+      </p:sp>
+    </p:spTree>
+    <p:extLst>
+      <p:ext uri="{BB962C8B-B14F-4D97-AF65-F5344CB8AC3E}">
+        <p14:creationId xmlns:p14="http://schemas.microsoft.com/office/powerpoint/2010/main" val="3335403507"/>
+      </p:ext>
+    </p:extLst>
+  </p:cSld>
+  <p:clrMapOvr>
+    <a:masterClrMapping/>
+  </p:clrMapOvr>
+  <p:timing>
+    <p:tnLst>
+      <p:par>
+        <p:cTn id="1" dur="indefinite" restart="never" nodeType="tmRoot"/>
+      </p:par>
+    </p:tnLst>
+  </p:timing>
+</p:sld>
+</file>
+
+<file path=ppt/slides/slide3.xml><?xml version="1.0" encoding="utf-8"?>
+<p:sld xmlns:a="http://schemas.openxmlformats.org/drawingml/2006/main" xmlns:r="http://schemas.openxmlformats.org/officeDocument/2006/relationships" xmlns:p="http://schemas.openxmlformats.org/presentationml/2006/main">
+  <p:cSld>
+    <p:spTree>
+      <p:nvGrpSpPr>
+        <p:cNvPr id="1" name=""/>
+        <p:cNvGrpSpPr/>
+        <p:nvPr/>
+      </p:nvGrpSpPr>
+      <p:grpSpPr>
+        <a:xfrm>
+          <a:off x="0" y="0"/>
+          <a:ext cx="0" cy="0"/>
+          <a:chOff x="0" y="0"/>
+          <a:chExt cx="0" cy="0"/>
+        </a:xfrm>
+      </p:grpSpPr>
+      <p:sp>
+        <p:nvSpPr>
+          <p:cNvPr id="2" name="Title 1"/>
+          <p:cNvSpPr>
+            <a:spLocks noGrp="1"/>
+          </p:cNvSpPr>
+          <p:nvPr>
+            <p:ph type="title"/>
+          </p:nvPr>
+        </p:nvSpPr>
+        <p:spPr>
+          <a:xfrm>
+            <a:off x="1371600" y="800099"/>
+            <a:ext cx="10820400" cy="1485900"/>
+          </a:xfrm>
+        </p:spPr>
+        <p:txBody>
+          <a:bodyPr>
+            <a:normAutofit/>
+          </a:bodyPr>
+          <a:lstStyle/>
+          <a:p>
             <a:r>
               <a:rPr lang="en-US" dirty="0" smtClean="0"/>
-              <a:t>Bell Work: </a:t>
+              <a:t>Quiz: 	   #</a:t>
             </a:r>
             <a:r>
               <a:rPr lang="en-US" dirty="0" smtClean="0"/>
-              <a:t>#1-2 </a:t>
+              <a:t>1-2 </a:t>
             </a:r>
             <a:r>
               <a:rPr lang="en-US" dirty="0" err="1" smtClean="0"/>
@@ -4104,31 +4226,31 @@
             </a:br>
             <a:r>
               <a:rPr lang="en-US" dirty="0" smtClean="0"/>
-              <a:t>	   </a:t>
+              <a:t>	   	 </a:t>
             </a:r>
             <a:r>
               <a:rPr lang="en-US" dirty="0" smtClean="0"/>
-              <a:t>	     #</a:t>
+              <a:t>  </a:t>
             </a:r>
             <a:r>
               <a:rPr lang="en-US" dirty="0" smtClean="0"/>
-              <a:t>3-4 Solve    </a:t>
+              <a:t>#3-4 Solve   </a:t>
             </a:r>
             <a:r>
               <a:rPr lang="en-US" dirty="0" smtClean="0"/>
-              <a:t>[</a:t>
+              <a:t> [</a:t>
             </a:r>
             <a:r>
               <a:rPr lang="en-US" dirty="0" smtClean="0"/>
-              <a:t>L3]	</a:t>
+              <a:t>L3</a:t>
             </a:r>
             <a:r>
               <a:rPr lang="en-US" dirty="0" smtClean="0"/>
-              <a:t>#</a:t>
+              <a:t>]	</a:t>
             </a:r>
             <a:r>
               <a:rPr lang="en-US" dirty="0" smtClean="0"/>
-              <a:t>5 Solve[L4]</a:t>
+              <a:t>	#5 Solve[L4]</a:t>
             </a:r>
             <a:endParaRPr lang="en-US" dirty="0"/>
           </a:p>
@@ -4652,7 +4774,7 @@
 </p:sld>
 </file>
 
-<file path=ppt/slides/slide3.xml><?xml version="1.0" encoding="utf-8"?>
+<file path=ppt/slides/slide4.xml><?xml version="1.0" encoding="utf-8"?>
 <p:sld xmlns:a="http://schemas.openxmlformats.org/drawingml/2006/main" xmlns:r="http://schemas.openxmlformats.org/officeDocument/2006/relationships" xmlns:p="http://schemas.openxmlformats.org/presentationml/2006/main">
   <p:cSld>
     <p:spTree>
@@ -4806,7 +4928,7 @@
 </p:sld>
 </file>
 
-<file path=ppt/slides/slide4.xml><?xml version="1.0" encoding="utf-8"?>
+<file path=ppt/slides/slide5.xml><?xml version="1.0" encoding="utf-8"?>
 <p:sld xmlns:a="http://schemas.openxmlformats.org/drawingml/2006/main" xmlns:r="http://schemas.openxmlformats.org/officeDocument/2006/relationships" xmlns:p="http://schemas.openxmlformats.org/presentationml/2006/main">
   <p:cSld>
     <p:spTree>

</xml_diff>